<commit_message>
Grammar and titles for figures
</commit_message>
<xml_diff>
--- a/poster/2024 eCTF Poster Template (copy).pptx
+++ b/poster/2024 eCTF Poster Template (copy).pptx
@@ -4629,7 +4629,7 @@
               <a:buNone/>
             </a:pPr>
             <a:r>
-              <a:rPr lang="en-US" sz="7200" b="1" strike="noStrike" spc="-1">
+              <a:rPr lang="en-US" sz="7200" b="1" strike="noStrike" spc="-1" dirty="0">
                 <a:solidFill>
                   <a:srgbClr val="000000"/>
                 </a:solidFill>
@@ -4637,7 +4637,7 @@
               </a:rPr>
               <a:t>Team Cacti</a:t>
             </a:r>
-            <a:endParaRPr lang="en-US" sz="7200" b="0" strike="noStrike" spc="-1">
+            <a:endParaRPr lang="en-US" sz="7200" b="0" strike="noStrike" spc="-1" dirty="0">
               <a:latin typeface="Arial"/>
             </a:endParaRPr>
           </a:p>
@@ -4649,7 +4649,7 @@
               <a:buNone/>
             </a:pPr>
             <a:r>
-              <a:rPr lang="en-US" sz="4000" b="1" strike="noStrike" spc="-1">
+              <a:rPr lang="en-US" sz="4000" b="1" strike="noStrike" spc="-1" dirty="0">
                 <a:solidFill>
                   <a:srgbClr val="000000"/>
                 </a:solidFill>
@@ -4657,7 +4657,7 @@
               </a:rPr>
               <a:t>University at Buffalo</a:t>
             </a:r>
-            <a:endParaRPr lang="en-US" sz="4000" b="0" strike="noStrike" spc="-1">
+            <a:endParaRPr lang="en-US" sz="4000" b="0" strike="noStrike" spc="-1" dirty="0">
               <a:latin typeface="Arial"/>
             </a:endParaRPr>
           </a:p>
@@ -4669,27 +4669,135 @@
               <a:buNone/>
             </a:pPr>
             <a:r>
-              <a:rPr lang="en-US" sz="2000" b="1" strike="noStrike" spc="-1">
+              <a:rPr lang="en-US" sz="2000" b="1" strike="noStrike" spc="-1" dirty="0" err="1">
                 <a:solidFill>
                   <a:srgbClr val="000000"/>
                 </a:solidFill>
                 <a:latin typeface="Arial Black"/>
               </a:rPr>
-              <a:t>Gaoxiang Liu, Zheyuan Ma, Alex Eastman, Xi Tan, MD Armanuzzaman, Sagar Mohan, Afton Spiegel,</a:t>
+              <a:t>Gaoxiang</a:t>
+            </a:r>
+            <a:r>
+              <a:rPr lang="en-US" sz="2000" b="1" strike="noStrike" spc="-1" dirty="0">
+                <a:solidFill>
+                  <a:srgbClr val="000000"/>
+                </a:solidFill>
+                <a:latin typeface="Arial Black"/>
+              </a:rPr>
+              <a:t> Liu, </a:t>
+            </a:r>
+            <a:r>
+              <a:rPr lang="en-US" sz="2000" b="1" strike="noStrike" spc="-1" dirty="0" err="1">
+                <a:solidFill>
+                  <a:srgbClr val="000000"/>
+                </a:solidFill>
+                <a:latin typeface="Arial Black"/>
+              </a:rPr>
+              <a:t>Zheyuan</a:t>
+            </a:r>
+            <a:r>
+              <a:rPr lang="en-US" sz="2000" b="1" strike="noStrike" spc="-1" dirty="0">
+                <a:solidFill>
+                  <a:srgbClr val="000000"/>
+                </a:solidFill>
+                <a:latin typeface="Arial Black"/>
+              </a:rPr>
+              <a:t> Ma, Alex Eastman, Xi Tan, MD </a:t>
+            </a:r>
+            <a:r>
+              <a:rPr lang="en-US" sz="2000" b="1" strike="noStrike" spc="-1" dirty="0" err="1">
+                <a:solidFill>
+                  <a:srgbClr val="000000"/>
+                </a:solidFill>
+                <a:latin typeface="Arial Black"/>
+              </a:rPr>
+              <a:t>Armanuzzaman</a:t>
+            </a:r>
+            <a:r>
+              <a:rPr lang="en-US" sz="2000" b="1" strike="noStrike" spc="-1" dirty="0">
+                <a:solidFill>
+                  <a:srgbClr val="000000"/>
+                </a:solidFill>
+                <a:latin typeface="Arial Black"/>
+              </a:rPr>
+              <a:t>, Sagar Mohan, Afton Spiegel,</a:t>
             </a:r>
             <a:br>
-              <a:rPr sz="2000"/>
+              <a:rPr sz="2000" dirty="0"/>
             </a:br>
             <a:r>
-              <a:rPr lang="en-US" sz="2000" b="1" strike="noStrike" spc="-1">
+              <a:rPr lang="en-US" sz="2000" b="1" strike="noStrike" spc="-1" dirty="0">
                 <a:solidFill>
                   <a:srgbClr val="000000"/>
                 </a:solidFill>
                 <a:latin typeface="Arial Black"/>
               </a:rPr>
-              <a:t>Barani Rajendran, Sai Bhargav Menta, Rumaizi Mopuri, Sai Venkata Akhila Achakala</a:t>
-            </a:r>
-            <a:endParaRPr lang="en-US" sz="2000" b="0" strike="noStrike" spc="-1">
+              <a:t>Barani Rajendran, Sai Bhargav Menta, </a:t>
+            </a:r>
+            <a:r>
+              <a:rPr lang="en-US" sz="2000" b="1" strike="noStrike" spc="-1" dirty="0" err="1">
+                <a:solidFill>
+                  <a:srgbClr val="000000"/>
+                </a:solidFill>
+                <a:latin typeface="Arial Black"/>
+              </a:rPr>
+              <a:t>Rumaizi</a:t>
+            </a:r>
+            <a:r>
+              <a:rPr lang="en-US" sz="2000" b="1" strike="noStrike" spc="-1" dirty="0">
+                <a:solidFill>
+                  <a:srgbClr val="000000"/>
+                </a:solidFill>
+                <a:latin typeface="Arial Black"/>
+              </a:rPr>
+              <a:t> </a:t>
+            </a:r>
+            <a:r>
+              <a:rPr lang="en-US" sz="2000" b="1" strike="noStrike" spc="-1" dirty="0" err="1">
+                <a:solidFill>
+                  <a:srgbClr val="000000"/>
+                </a:solidFill>
+                <a:latin typeface="Arial Black"/>
+              </a:rPr>
+              <a:t>Mopuri</a:t>
+            </a:r>
+            <a:r>
+              <a:rPr lang="en-US" sz="2000" b="1" strike="noStrike" spc="-1" dirty="0">
+                <a:solidFill>
+                  <a:srgbClr val="000000"/>
+                </a:solidFill>
+                <a:latin typeface="Arial Black"/>
+              </a:rPr>
+              <a:t>, Sai Venkata </a:t>
+            </a:r>
+            <a:r>
+              <a:rPr lang="en-US" sz="2000" b="1" strike="noStrike" spc="-1" dirty="0" err="1">
+                <a:solidFill>
+                  <a:srgbClr val="000000"/>
+                </a:solidFill>
+                <a:latin typeface="Arial Black"/>
+              </a:rPr>
+              <a:t>Akhila</a:t>
+            </a:r>
+            <a:r>
+              <a:rPr lang="en-US" sz="2000" b="1" strike="noStrike" spc="-1" dirty="0">
+                <a:solidFill>
+                  <a:srgbClr val="000000"/>
+                </a:solidFill>
+                <a:latin typeface="Arial Black"/>
+              </a:rPr>
+              <a:t> </a:t>
+            </a:r>
+            <a:r>
+              <a:rPr lang="en-US" sz="2000" b="1" strike="noStrike" spc="-1" dirty="0" err="1">
+                <a:solidFill>
+                  <a:srgbClr val="000000"/>
+                </a:solidFill>
+                <a:latin typeface="Arial Black"/>
+              </a:rPr>
+              <a:t>Achakala</a:t>
+            </a:r>
+            <a:endParaRPr lang="en-US" sz="2000" b="0" strike="noStrike" spc="-1" dirty="0">
               <a:latin typeface="Arial"/>
             </a:endParaRPr>
           </a:p>
@@ -4701,15 +4809,33 @@
               <a:buNone/>
             </a:pPr>
             <a:r>
-              <a:rPr lang="en-US" sz="2000" b="1" strike="noStrike" spc="-1">
+              <a:rPr lang="en-US" sz="2000" b="1" strike="noStrike" spc="-1" dirty="0">
                 <a:solidFill>
                   <a:srgbClr val="000000"/>
                 </a:solidFill>
                 <a:latin typeface="Arial Black"/>
               </a:rPr>
-              <a:t>Advised by: Dr. Ziming Zhao, PhD</a:t>
-            </a:r>
-            <a:endParaRPr lang="en-US" sz="2000" b="0" strike="noStrike" spc="-1">
+              <a:t>Advised by: Dr. </a:t>
+            </a:r>
+            <a:r>
+              <a:rPr lang="en-US" sz="2000" b="1" strike="noStrike" spc="-1" dirty="0" err="1">
+                <a:solidFill>
+                  <a:srgbClr val="000000"/>
+                </a:solidFill>
+                <a:latin typeface="Arial Black"/>
+              </a:rPr>
+              <a:t>Ziming</a:t>
+            </a:r>
+            <a:r>
+              <a:rPr lang="en-US" sz="2000" b="1" strike="noStrike" spc="-1" dirty="0">
+                <a:solidFill>
+                  <a:srgbClr val="000000"/>
+                </a:solidFill>
+                <a:latin typeface="Arial Black"/>
+              </a:rPr>
+              <a:t> Zhao, PhD</a:t>
+            </a:r>
+            <a:endParaRPr lang="en-US" sz="2000" b="0" strike="noStrike" spc="-1" dirty="0">
               <a:latin typeface="Arial"/>
             </a:endParaRPr>
           </a:p>
@@ -5318,16 +5444,6 @@
                 <a:ea typeface="Calibri"/>
               </a:rPr>
               <a:t>validity</a:t>
-            </a:r>
-            <a:r>
-              <a:rPr lang="en-US" sz="2000" b="0" strike="noStrike" spc="-1" dirty="0">
-                <a:solidFill>
-                  <a:srgbClr val="000000"/>
-                </a:solidFill>
-                <a:latin typeface="Arial"/>
-                <a:ea typeface="Calibri"/>
-              </a:rPr>
-              <a:t>.</a:t>
             </a:r>
             <a:endParaRPr lang="en-US" sz="2000" b="0" strike="noStrike" spc="-1" dirty="0">
               <a:latin typeface="Arial"/>
@@ -6587,7 +6703,7 @@
                 </a:solidFill>
                 <a:latin typeface="Arial"/>
               </a:rPr>
-              <a:t>. After validation, the component provides the encrypted attestation PIN to the AP.</a:t>
+              <a:t>. After validation, the component provides the encrypted attestation PIN to the AP</a:t>
             </a:r>
             <a:endParaRPr lang="en-US" sz="2000" b="0" strike="noStrike" spc="-1" dirty="0">
               <a:latin typeface="Arial"/>
@@ -6627,7 +6743,7 @@
                 </a:solidFill>
                 <a:latin typeface="Arial"/>
               </a:rPr>
-              <a:t>The AP verifies each component by having it sign a random number; the components then validate the AP similarly. On successful validation, both the AP and components boot up.</a:t>
+              <a:t>The AP verifies each component by having it sign a random number; the components then validate the AP similarly. On successful validation, both the AP and components boot up</a:t>
             </a:r>
             <a:endParaRPr lang="en-US" sz="2000" b="0" strike="noStrike" spc="-1" dirty="0">
               <a:latin typeface="Arial"/>
@@ -6758,7 +6874,7 @@
                 </a:solidFill>
                 <a:latin typeface="Arial"/>
               </a:rPr>
-              <a:t>e recipient. If the recipient can verify the signature, it trusts the data. </a:t>
+              <a:t>e recipient. If the recipient can verify the signature, it trusts the data </a:t>
             </a:r>
             <a:endParaRPr lang="en-US" sz="2000" b="0" strike="noStrike" spc="-1" dirty="0">
               <a:latin typeface="Arial"/>
@@ -6798,7 +6914,7 @@
                 </a:solidFill>
                 <a:latin typeface="Arial"/>
               </a:rPr>
-              <a:t>We only store the Argon2 keyed-hash values of the PIN and token. User input is also hashed, and a constant time comparator is used to verify hash values.</a:t>
+              <a:t>We only store the Argon2 keyed-hash values of the PIN and token. User input is also hashed, and a constant time comparator is used to verify hash values</a:t>
             </a:r>
             <a:endParaRPr lang="en-US" sz="2000" b="0" strike="noStrike" spc="-1" dirty="0">
               <a:latin typeface="Arial"/>

</xml_diff>